<commit_message>
images and stylization updates
</commit_message>
<xml_diff>
--- a/Интерактивна химия.pptx
+++ b/Интерактивна химия.pptx
@@ -5225,47 +5225,12 @@
       </p:grpSpPr>
       <p:pic>
         <p:nvPicPr>
-          <p:cNvPr id="4" name="Картина 3">
-            <a:extLst>
-              <a:ext uri="{FF2B5EF4-FFF2-40B4-BE49-F238E27FC236}">
-                <a16:creationId xmlns:a16="http://schemas.microsoft.com/office/drawing/2014/main" id="{B966DA08-89A8-0B89-DDAA-BD0BB340AA10}"/>
-              </a:ext>
-            </a:extLst>
-          </p:cNvPr>
-          <p:cNvPicPr>
-            <a:picLocks noChangeAspect="1"/>
-          </p:cNvPicPr>
-          <p:nvPr/>
-        </p:nvPicPr>
-        <p:blipFill rotWithShape="1">
-          <a:blip r:embed="rId3"/>
-          <a:srcRect l="10816" t="7699" r="8994" b="13151"/>
-          <a:stretch/>
-        </p:blipFill>
-        <p:spPr>
-          <a:xfrm>
-            <a:off x="6794151" y="1463226"/>
-            <a:ext cx="1527598" cy="1507800"/>
-          </a:xfrm>
-          <a:prstGeom prst="rect">
-            <a:avLst/>
-          </a:prstGeom>
-          <a:ln>
-            <a:noFill/>
-          </a:ln>
-          <a:effectLst>
-            <a:softEdge rad="112500"/>
-          </a:effectLst>
-        </p:spPr>
-      </p:pic>
-      <p:pic>
-        <p:nvPicPr>
           <p:cNvPr id="177" name="Google Shape;177;p34"/>
           <p:cNvPicPr preferRelativeResize="0"/>
           <p:nvPr/>
         </p:nvPicPr>
         <p:blipFill>
-          <a:blip r:embed="rId4">
+          <a:blip r:embed="rId3">
             <a:alphaModFix/>
           </a:blip>
           <a:stretch>
@@ -5293,7 +5258,7 @@
           <p:nvPr/>
         </p:nvPicPr>
         <p:blipFill>
-          <a:blip r:embed="rId5">
+          <a:blip r:embed="rId4">
             <a:alphaModFix/>
           </a:blip>
           <a:stretch>
@@ -5321,7 +5286,7 @@
           <p:nvPr/>
         </p:nvPicPr>
         <p:blipFill>
-          <a:blip r:embed="rId6">
+          <a:blip r:embed="rId5">
             <a:alphaModFix/>
           </a:blip>
           <a:stretch>
@@ -5399,7 +5364,7 @@
           <p:nvPr/>
         </p:nvPicPr>
         <p:blipFill>
-          <a:blip r:embed="rId7">
+          <a:blip r:embed="rId6">
             <a:alphaModFix/>
           </a:blip>
           <a:stretch>
@@ -5432,7 +5397,7 @@
         </p:nvSpPr>
         <p:spPr>
           <a:xfrm>
-            <a:off x="1063550" y="1867300"/>
+            <a:off x="1063550" y="1747821"/>
             <a:ext cx="6562500" cy="1507800"/>
           </a:xfrm>
           <a:prstGeom prst="rect">
@@ -5464,14 +5429,6 @@
             <a:r>
               <a:rPr lang="bg-BG" dirty="0"/>
               <a:t>ХИМИЯ</a:t>
-            </a:r>
-            <a:r>
-              <a:rPr lang="en-US" dirty="0"/>
-              <a:t> – </a:t>
-            </a:r>
-            <a:r>
-              <a:rPr lang="bg-BG" dirty="0"/>
-              <a:t>ПРОЕКТ №272</a:t>
             </a:r>
             <a:endParaRPr dirty="0"/>
           </a:p>
@@ -6170,7 +6127,7 @@
         </p:nvSpPr>
         <p:spPr>
           <a:xfrm>
-            <a:off x="1091999" y="940006"/>
+            <a:off x="1091999" y="1375144"/>
             <a:ext cx="2353927" cy="523220"/>
           </a:xfrm>
           <a:prstGeom prst="rect">
@@ -6191,6 +6148,75 @@
                 <a:cs typeface="Lato" panose="020F0502020204030204" pitchFamily="34" charset="0"/>
               </a:rPr>
               <a:t>НОИТ 2024</a:t>
+            </a:r>
+          </a:p>
+        </p:txBody>
+      </p:sp>
+      <p:pic>
+        <p:nvPicPr>
+          <p:cNvPr id="5" name="Картина 4">
+            <a:extLst>
+              <a:ext uri="{FF2B5EF4-FFF2-40B4-BE49-F238E27FC236}">
+                <a16:creationId xmlns:a16="http://schemas.microsoft.com/office/drawing/2014/main" id="{927FB6AF-B0E1-92D7-D6AE-D3191E8EE2F2}"/>
+              </a:ext>
+            </a:extLst>
+          </p:cNvPr>
+          <p:cNvPicPr>
+            <a:picLocks noChangeAspect="1"/>
+          </p:cNvPicPr>
+          <p:nvPr/>
+        </p:nvPicPr>
+        <p:blipFill>
+          <a:blip r:embed="rId7"/>
+          <a:stretch>
+            <a:fillRect/>
+          </a:stretch>
+        </p:blipFill>
+        <p:spPr>
+          <a:xfrm>
+            <a:off x="6984630" y="1375144"/>
+            <a:ext cx="1458872" cy="1417970"/>
+          </a:xfrm>
+          <a:prstGeom prst="rect">
+            <a:avLst/>
+          </a:prstGeom>
+        </p:spPr>
+      </p:pic>
+      <p:sp>
+        <p:nvSpPr>
+          <p:cNvPr id="6" name="Текстово поле 5">
+            <a:extLst>
+              <a:ext uri="{FF2B5EF4-FFF2-40B4-BE49-F238E27FC236}">
+                <a16:creationId xmlns:a16="http://schemas.microsoft.com/office/drawing/2014/main" id="{9ED880BA-9E11-36AB-E61A-B2A0AC8D2FDF}"/>
+              </a:ext>
+            </a:extLst>
+          </p:cNvPr>
+          <p:cNvSpPr txBox="1"/>
+          <p:nvPr/>
+        </p:nvSpPr>
+        <p:spPr>
+          <a:xfrm>
+            <a:off x="1058273" y="3104593"/>
+            <a:ext cx="2771913" cy="523220"/>
+          </a:xfrm>
+          <a:prstGeom prst="rect">
+            <a:avLst/>
+          </a:prstGeom>
+          <a:noFill/>
+        </p:spPr>
+        <p:txBody>
+          <a:bodyPr wrap="none" rtlCol="0">
+            <a:spAutoFit/>
+          </a:bodyPr>
+          <a:lstStyle/>
+          <a:p>
+            <a:r>
+              <a:rPr lang="bg-BG" sz="2800" b="1" dirty="0">
+                <a:latin typeface="Lato" panose="020F0502020204030203" pitchFamily="34" charset="0"/>
+                <a:ea typeface="Lato" panose="020F0502020204030203" pitchFamily="34" charset="0"/>
+                <a:cs typeface="Lato" panose="020F0502020204030203" pitchFamily="34" charset="0"/>
+              </a:rPr>
+              <a:t>ПРОЕКТ №272</a:t>
             </a:r>
           </a:p>
         </p:txBody>
@@ -6297,7 +6323,7 @@
             </a:pPr>
             <a:r>
               <a:rPr lang="bg-BG" dirty="0"/>
-              <a:t>Проектът “Интерактивна химия” представлява уеб приложение, имащо за цел да помогне на учениците с усвояването на учебния материал по химия и опазване на околната среда. Той прави усвояването лесно и интересно. Проектът визуализира периодичната таблица и всички химични елементи. </a:t>
+              <a:t>Проектът “Интерактивна химия” представлява уеб приложение, имащо за цел да помогне на учениците с усвояването на учебния материал по химия и опазване на околната среда. Той прави усвояването лесно и интересно. Проектът визуализира периодичната таблица и  информация за всички изучени химични елементи. </a:t>
             </a:r>
             <a:endParaRPr dirty="0"/>
           </a:p>
@@ -6959,7 +6985,7 @@
             </a:pPr>
             <a:r>
               <a:rPr lang="bg-BG" dirty="0"/>
-              <a:t>РЕСУРСИ</a:t>
+              <a:t>ИЗПОЛЗВАНА ЛИТЕРАТУРА</a:t>
             </a:r>
             <a:endParaRPr dirty="0"/>
           </a:p>
@@ -7005,7 +7031,22 @@
             </a:r>
             <a:r>
               <a:rPr lang="bg-BG" dirty="0"/>
-              <a:t> Статии за различните химични елементи в Уикипедия</a:t>
+              <a:t> </a:t>
+            </a:r>
+            <a:endParaRPr lang="en-US" dirty="0"/>
+          </a:p>
+          <a:p>
+            <a:pPr marL="0" indent="0">
+              <a:buSzPts val="1100"/>
+              <a:buNone/>
+            </a:pPr>
+            <a:r>
+              <a:rPr lang="en-US" dirty="0"/>
+              <a:t>   </a:t>
+            </a:r>
+            <a:r>
+              <a:rPr lang="bg-BG" dirty="0"/>
+              <a:t>Статии за различните химични елементи в Уикипедия</a:t>
             </a:r>
           </a:p>
           <a:p>
@@ -7025,6 +7066,16 @@
             <a:r>
               <a:rPr lang="en-US" dirty="0"/>
               <a:t> </a:t>
+            </a:r>
+          </a:p>
+          <a:p>
+            <a:pPr marL="0" indent="0">
+              <a:buSzPts val="1100"/>
+              <a:buNone/>
+            </a:pPr>
+            <a:r>
+              <a:rPr lang="en-US" dirty="0"/>
+              <a:t>   </a:t>
             </a:r>
             <a:r>
               <a:rPr lang="ru-RU" dirty="0"/>

</xml_diff>